<commit_message>
Update CT Project Weekly Status Report.pptx
</commit_message>
<xml_diff>
--- a/Week2 Pre/CT Project Weekly Status Report.pptx
+++ b/Week2 Pre/CT Project Weekly Status Report.pptx
@@ -7549,7 +7549,7 @@
                   <a:schemeClr val="tx2"/>
                 </a:solidFill>
               </a:rPr>
-              <a:t>//TODO</a:t>
+              <a:t>Created UI/UX mind maps and comparisons for existing apps</a:t>
             </a:r>
           </a:p>
           <a:p>
@@ -7968,6 +7968,36 @@
           </a:p>
         </p:txBody>
       </p:sp>
+      <p:pic>
+        <p:nvPicPr>
+          <p:cNvPr id="3" name="Picture 2">
+            <a:extLst>
+              <a:ext uri="{FF2B5EF4-FFF2-40B4-BE49-F238E27FC236}">
+                <a16:creationId xmlns:a16="http://schemas.microsoft.com/office/drawing/2014/main" id="{BCD295D7-3CFB-4582-9E6B-8A4D43BFAF3D}"/>
+              </a:ext>
+            </a:extLst>
+          </p:cNvPr>
+          <p:cNvPicPr>
+            <a:picLocks noChangeAspect="1"/>
+          </p:cNvPicPr>
+          <p:nvPr/>
+        </p:nvPicPr>
+        <p:blipFill>
+          <a:blip r:embed="rId3"/>
+          <a:stretch>
+            <a:fillRect/>
+          </a:stretch>
+        </p:blipFill>
+        <p:spPr>
+          <a:xfrm>
+            <a:off x="8623299" y="341385"/>
+            <a:ext cx="3337698" cy="5993414"/>
+          </a:xfrm>
+          <a:prstGeom prst="rect">
+            <a:avLst/>
+          </a:prstGeom>
+        </p:spPr>
+      </p:pic>
     </p:spTree>
     <p:extLst>
       <p:ext uri="{BB962C8B-B14F-4D97-AF65-F5344CB8AC3E}">
@@ -8084,19 +8114,38 @@
                   <a:schemeClr val="tx2"/>
                 </a:solidFill>
               </a:rPr>
-              <a:t>Starting coding</a:t>
+              <a:t>Start the application development phase</a:t>
+            </a:r>
+          </a:p>
+          <a:p>
+            <a:pPr lvl="1"/>
+            <a:r>
+              <a:rPr lang="en-US" dirty="0">
+                <a:solidFill>
+                  <a:schemeClr val="tx2"/>
+                </a:solidFill>
+              </a:rPr>
+              <a:t>Create use cases and scenario designs</a:t>
+            </a:r>
+          </a:p>
+          <a:p>
+            <a:pPr lvl="1"/>
+            <a:r>
+              <a:rPr lang="en-US" dirty="0">
+                <a:solidFill>
+                  <a:schemeClr val="tx2"/>
+                </a:solidFill>
+              </a:rPr>
+              <a:t>Start implementation/coding and finish UI designs</a:t>
             </a:r>
           </a:p>
           <a:p>
             <a:pPr lvl="0"/>
-            <a:r>
-              <a:rPr lang="en-US" dirty="0">
-                <a:solidFill>
-                  <a:schemeClr val="tx2"/>
-                </a:solidFill>
-              </a:rPr>
-              <a:t>//TODO</a:t>
-            </a:r>
+            <a:endParaRPr lang="en-US" dirty="0">
+              <a:solidFill>
+                <a:schemeClr val="tx2"/>
+              </a:solidFill>
+            </a:endParaRPr>
           </a:p>
           <a:p>
             <a:pPr lvl="0"/>

</xml_diff>